<commit_message>
Efecto del empleo de la matriz de permutación para intercambio de columnas
</commit_message>
<xml_diff>
--- a/lectures_strang_en/Lecture_02_Strang_EN.pptx
+++ b/lectures_strang_en/Lecture_02_Strang_EN.pptx
@@ -237,7 +237,7 @@
           <a:p>
             <a:fld id="{C7B76BB3-96B4-D949-BA97-2F034CC20E35}" type="datetimeFigureOut">
               <a:rPr lang="es-ES_tradnl" smtClean="0"/>
-              <a:t>18/03/2024</a:t>
+              <a:t>19/03/2024</a:t>
             </a:fld>
             <a:endParaRPr lang="es-ES_tradnl"/>
           </a:p>
@@ -410,7 +410,7 @@
           <a:p>
             <a:fld id="{BC3897DA-3038-2943-8BC6-34E6C6DE6379}" type="datetimeFigureOut">
               <a:rPr lang="es-ES_tradnl" smtClean="0"/>
-              <a:t>18/03/2024</a:t>
+              <a:t>19/03/2024</a:t>
             </a:fld>
             <a:endParaRPr lang="es-ES_tradnl"/>
           </a:p>
@@ -872,7 +872,7 @@
             <a:fld id="{75EEBB46-7A81-4557-A313-00D814F92FCC}" type="datetimeFigureOut">
               <a:rPr lang="es-ES" smtClean="0"/>
               <a:pPr/>
-              <a:t>18/03/2024</a:t>
+              <a:t>19/03/2024</a:t>
             </a:fld>
             <a:endParaRPr lang="es-ES"/>
           </a:p>
@@ -1235,7 +1235,7 @@
             <a:fld id="{75EEBB46-7A81-4557-A313-00D814F92FCC}" type="datetimeFigureOut">
               <a:rPr lang="es-ES" smtClean="0"/>
               <a:pPr/>
-              <a:t>18/03/2024</a:t>
+              <a:t>19/03/2024</a:t>
             </a:fld>
             <a:endParaRPr lang="es-ES"/>
           </a:p>
@@ -1420,7 +1420,7 @@
             <a:fld id="{75EEBB46-7A81-4557-A313-00D814F92FCC}" type="datetimeFigureOut">
               <a:rPr lang="es-ES" smtClean="0"/>
               <a:pPr/>
-              <a:t>18/03/2024</a:t>
+              <a:t>19/03/2024</a:t>
             </a:fld>
             <a:endParaRPr lang="es-ES"/>
           </a:p>
@@ -1543,7 +1543,7 @@
             <a:fld id="{75EEBB46-7A81-4557-A313-00D814F92FCC}" type="datetimeFigureOut">
               <a:rPr lang="es-ES" smtClean="0"/>
               <a:pPr/>
-              <a:t>18/03/2024</a:t>
+              <a:t>19/03/2024</a:t>
             </a:fld>
             <a:endParaRPr lang="es-ES"/>
           </a:p>
@@ -1911,7 +1911,7 @@
             <a:fld id="{75EEBB46-7A81-4557-A313-00D814F92FCC}" type="datetimeFigureOut">
               <a:rPr lang="es-ES" smtClean="0"/>
               <a:pPr/>
-              <a:t>18/03/2024</a:t>
+              <a:t>19/03/2024</a:t>
             </a:fld>
             <a:endParaRPr lang="es-ES"/>
           </a:p>
@@ -2186,7 +2186,7 @@
             <a:fld id="{75EEBB46-7A81-4557-A313-00D814F92FCC}" type="datetimeFigureOut">
               <a:rPr lang="es-ES" smtClean="0"/>
               <a:pPr/>
-              <a:t>18/03/2024</a:t>
+              <a:t>19/03/2024</a:t>
             </a:fld>
             <a:endParaRPr lang="es-ES"/>
           </a:p>
@@ -2558,7 +2558,7 @@
             <a:fld id="{75EEBB46-7A81-4557-A313-00D814F92FCC}" type="datetimeFigureOut">
               <a:rPr lang="es-ES" smtClean="0"/>
               <a:pPr/>
-              <a:t>18/03/2024</a:t>
+              <a:t>19/03/2024</a:t>
             </a:fld>
             <a:endParaRPr lang="es-ES"/>
           </a:p>
@@ -2795,7 +2795,7 @@
             <a:fld id="{75EEBB46-7A81-4557-A313-00D814F92FCC}" type="datetimeFigureOut">
               <a:rPr lang="es-ES" smtClean="0"/>
               <a:pPr/>
-              <a:t>18/03/2024</a:t>
+              <a:t>19/03/2024</a:t>
             </a:fld>
             <a:endParaRPr lang="es-ES"/>
           </a:p>
@@ -2895,7 +2895,7 @@
             <a:fld id="{75EEBB46-7A81-4557-A313-00D814F92FCC}" type="datetimeFigureOut">
               <a:rPr lang="es-ES" smtClean="0"/>
               <a:pPr/>
-              <a:t>18/03/2024</a:t>
+              <a:t>19/03/2024</a:t>
             </a:fld>
             <a:endParaRPr lang="es-ES"/>
           </a:p>
@@ -3172,7 +3172,7 @@
             <a:fld id="{75EEBB46-7A81-4557-A313-00D814F92FCC}" type="datetimeFigureOut">
               <a:rPr lang="es-ES" smtClean="0"/>
               <a:pPr/>
-              <a:t>18/03/2024</a:t>
+              <a:t>19/03/2024</a:t>
             </a:fld>
             <a:endParaRPr lang="es-ES"/>
           </a:p>
@@ -3410,7 +3410,7 @@
             <a:fld id="{75EEBB46-7A81-4557-A313-00D814F92FCC}" type="datetimeFigureOut">
               <a:rPr lang="es-ES" smtClean="0"/>
               <a:pPr/>
-              <a:t>18/03/2024</a:t>
+              <a:t>19/03/2024</a:t>
             </a:fld>
             <a:endParaRPr lang="es-ES"/>
           </a:p>
@@ -3911,7 +3911,7 @@
             <a:fld id="{75EEBB46-7A81-4557-A313-00D814F92FCC}" type="datetimeFigureOut">
               <a:rPr lang="es-ES" smtClean="0"/>
               <a:pPr/>
-              <a:t>18/03/2024</a:t>
+              <a:t>19/03/2024</a:t>
             </a:fld>
             <a:endParaRPr lang="es-ES"/>
           </a:p>
@@ -22537,8 +22537,8 @@
           </a:p>
         </p:txBody>
       </p:sp>
-      <mc:AlternateContent xmlns:mc="http://schemas.openxmlformats.org/markup-compatibility/2006">
-        <mc:Choice xmlns:a14="http://schemas.microsoft.com/office/drawing/2010/main" Requires="a14">
+      <mc:AlternateContent xmlns:mc="http://schemas.openxmlformats.org/markup-compatibility/2006" xmlns:a14="http://schemas.microsoft.com/office/drawing/2010/main">
+        <mc:Choice Requires="a14">
           <p:sp>
             <p:nvSpPr>
               <p:cNvPr id="11" name="Rectángulo 10">
@@ -22805,7 +22805,7 @@
             </p:txBody>
           </p:sp>
         </mc:Choice>
-        <mc:Fallback>
+        <mc:Fallback xmlns="">
           <p:sp>
             <p:nvSpPr>
               <p:cNvPr id="11" name="Rectángulo 10">
@@ -23157,8 +23157,8 @@
           </a:p>
         </p:txBody>
       </p:sp>
-      <mc:AlternateContent xmlns:mc="http://schemas.openxmlformats.org/markup-compatibility/2006">
-        <mc:Choice xmlns:a14="http://schemas.microsoft.com/office/drawing/2010/main" Requires="a14">
+      <mc:AlternateContent xmlns:mc="http://schemas.openxmlformats.org/markup-compatibility/2006" xmlns:a14="http://schemas.microsoft.com/office/drawing/2010/main">
+        <mc:Choice Requires="a14">
           <p:sp>
             <p:nvSpPr>
               <p:cNvPr id="14" name="Rectángulo 13">
@@ -23425,7 +23425,7 @@
             </p:txBody>
           </p:sp>
         </mc:Choice>
-        <mc:Fallback>
+        <mc:Fallback xmlns="">
           <p:sp>
             <p:nvSpPr>
               <p:cNvPr id="14" name="Rectángulo 13">
@@ -24224,18 +24224,18 @@
                           <m:mr>
                             <m:e>
                               <m:r>
-                                <a:rPr lang="es-ES" b="0" i="1" smtClean="0">
-                                  <a:latin typeface="Cambria Math" panose="02040503050406030204" pitchFamily="18" charset="0"/>
-                                </a:rPr>
-                                <m:t>𝑐</m:t>
+                                <a:rPr lang="es-419" b="0" i="1" smtClean="0">
+                                  <a:latin typeface="Cambria Math" panose="02040503050406030204" pitchFamily="18" charset="0"/>
+                                </a:rPr>
+                                <m:t>𝑑</m:t>
                               </m:r>
                             </m:e>
                             <m:e>
                               <m:r>
-                                <a:rPr lang="es-ES" b="0" i="1" smtClean="0">
-                                  <a:latin typeface="Cambria Math" panose="02040503050406030204" pitchFamily="18" charset="0"/>
-                                </a:rPr>
-                                <m:t>𝑑</m:t>
+                                <a:rPr lang="es-419" b="0" i="1" smtClean="0">
+                                  <a:latin typeface="Cambria Math" panose="02040503050406030204" pitchFamily="18" charset="0"/>
+                                </a:rPr>
+                                <m:t>𝑐</m:t>
                               </m:r>
                             </m:e>
                           </m:mr>
@@ -24294,8 +24294,8 @@
           </p:sp>
         </mc:Fallback>
       </mc:AlternateContent>
-      <mc:AlternateContent xmlns:mc="http://schemas.openxmlformats.org/markup-compatibility/2006">
-        <mc:Choice xmlns:a14="http://schemas.microsoft.com/office/drawing/2010/main" Requires="a14">
+      <mc:AlternateContent xmlns:mc="http://schemas.openxmlformats.org/markup-compatibility/2006" xmlns:a14="http://schemas.microsoft.com/office/drawing/2010/main">
+        <mc:Choice Requires="a14">
           <p:sp>
             <p:nvSpPr>
               <p:cNvPr id="19" name="Rectángulo 18">
@@ -24579,7 +24579,7 @@
             </p:txBody>
           </p:sp>
         </mc:Choice>
-        <mc:Fallback>
+        <mc:Fallback xmlns="">
           <p:sp>
             <p:nvSpPr>
               <p:cNvPr id="19" name="Rectángulo 18">
@@ -24624,8 +24624,8 @@
           </p:sp>
         </mc:Fallback>
       </mc:AlternateContent>
-      <mc:AlternateContent xmlns:mc="http://schemas.openxmlformats.org/markup-compatibility/2006">
-        <mc:Choice xmlns:a14="http://schemas.microsoft.com/office/drawing/2010/main" Requires="a14">
+      <mc:AlternateContent xmlns:mc="http://schemas.openxmlformats.org/markup-compatibility/2006" xmlns:a14="http://schemas.microsoft.com/office/drawing/2010/main">
+        <mc:Choice Requires="a14">
           <p:sp>
             <p:nvSpPr>
               <p:cNvPr id="6" name="Rectángulo 5">
@@ -24847,7 +24847,7 @@
             </p:txBody>
           </p:sp>
         </mc:Choice>
-        <mc:Fallback>
+        <mc:Fallback xmlns="">
           <p:sp>
             <p:nvSpPr>
               <p:cNvPr id="6" name="Rectángulo 5">
@@ -24892,8 +24892,8 @@
           </p:sp>
         </mc:Fallback>
       </mc:AlternateContent>
-      <mc:AlternateContent xmlns:mc="http://schemas.openxmlformats.org/markup-compatibility/2006">
-        <mc:Choice xmlns:a14="http://schemas.microsoft.com/office/drawing/2010/main" Requires="a14">
+      <mc:AlternateContent xmlns:mc="http://schemas.openxmlformats.org/markup-compatibility/2006" xmlns:a14="http://schemas.microsoft.com/office/drawing/2010/main">
+        <mc:Choice Requires="a14">
           <p:sp>
             <p:nvSpPr>
               <p:cNvPr id="21" name="Rectángulo 20">
@@ -25115,7 +25115,7 @@
             </p:txBody>
           </p:sp>
         </mc:Choice>
-        <mc:Fallback>
+        <mc:Fallback xmlns="">
           <p:sp>
             <p:nvSpPr>
               <p:cNvPr id="21" name="Rectángulo 20">

</xml_diff>